<commit_message>
fixed set expire error, add redpacket message
</commit_message>
<xml_diff>
--- a/front/public/pic.pptx
+++ b/front/public/pic.pptx
@@ -104,6 +104,11 @@
       </a:defRPr>
     </a:lvl9pPr>
   </p:defaultTextStyle>
+  <p:extLst>
+    <p:ext uri="{EFAFB233-063F-42B5-8137-9DF3F51BA10A}">
+      <p15:sldGuideLst xmlns:p15="http://schemas.microsoft.com/office/powerpoint/2012/main"/>
+    </p:ext>
+  </p:extLst>
 </p:presentation>
 </file>
 
@@ -254,7 +259,7 @@
           <a:p>
             <a:fld id="{72BAB100-02CC-449F-BB38-EDA663640175}" type="datetimeFigureOut">
               <a:rPr lang="zh-CN" altLang="en-US" smtClean="0"/>
-              <a:t>2022/3/21</a:t>
+              <a:t>2022/3/26</a:t>
             </a:fld>
             <a:endParaRPr lang="zh-CN" altLang="en-US"/>
           </a:p>
@@ -452,7 +457,7 @@
           <a:p>
             <a:fld id="{72BAB100-02CC-449F-BB38-EDA663640175}" type="datetimeFigureOut">
               <a:rPr lang="zh-CN" altLang="en-US" smtClean="0"/>
-              <a:t>2022/3/21</a:t>
+              <a:t>2022/3/26</a:t>
             </a:fld>
             <a:endParaRPr lang="zh-CN" altLang="en-US"/>
           </a:p>
@@ -660,7 +665,7 @@
           <a:p>
             <a:fld id="{72BAB100-02CC-449F-BB38-EDA663640175}" type="datetimeFigureOut">
               <a:rPr lang="zh-CN" altLang="en-US" smtClean="0"/>
-              <a:t>2022/3/21</a:t>
+              <a:t>2022/3/26</a:t>
             </a:fld>
             <a:endParaRPr lang="zh-CN" altLang="en-US"/>
           </a:p>
@@ -858,7 +863,7 @@
           <a:p>
             <a:fld id="{72BAB100-02CC-449F-BB38-EDA663640175}" type="datetimeFigureOut">
               <a:rPr lang="zh-CN" altLang="en-US" smtClean="0"/>
-              <a:t>2022/3/21</a:t>
+              <a:t>2022/3/26</a:t>
             </a:fld>
             <a:endParaRPr lang="zh-CN" altLang="en-US"/>
           </a:p>
@@ -1133,7 +1138,7 @@
           <a:p>
             <a:fld id="{72BAB100-02CC-449F-BB38-EDA663640175}" type="datetimeFigureOut">
               <a:rPr lang="zh-CN" altLang="en-US" smtClean="0"/>
-              <a:t>2022/3/21</a:t>
+              <a:t>2022/3/26</a:t>
             </a:fld>
             <a:endParaRPr lang="zh-CN" altLang="en-US"/>
           </a:p>
@@ -1398,7 +1403,7 @@
           <a:p>
             <a:fld id="{72BAB100-02CC-449F-BB38-EDA663640175}" type="datetimeFigureOut">
               <a:rPr lang="zh-CN" altLang="en-US" smtClean="0"/>
-              <a:t>2022/3/21</a:t>
+              <a:t>2022/3/26</a:t>
             </a:fld>
             <a:endParaRPr lang="zh-CN" altLang="en-US"/>
           </a:p>
@@ -1810,7 +1815,7 @@
           <a:p>
             <a:fld id="{72BAB100-02CC-449F-BB38-EDA663640175}" type="datetimeFigureOut">
               <a:rPr lang="zh-CN" altLang="en-US" smtClean="0"/>
-              <a:t>2022/3/21</a:t>
+              <a:t>2022/3/26</a:t>
             </a:fld>
             <a:endParaRPr lang="zh-CN" altLang="en-US"/>
           </a:p>
@@ -1951,7 +1956,7 @@
           <a:p>
             <a:fld id="{72BAB100-02CC-449F-BB38-EDA663640175}" type="datetimeFigureOut">
               <a:rPr lang="zh-CN" altLang="en-US" smtClean="0"/>
-              <a:t>2022/3/21</a:t>
+              <a:t>2022/3/26</a:t>
             </a:fld>
             <a:endParaRPr lang="zh-CN" altLang="en-US"/>
           </a:p>
@@ -2064,7 +2069,7 @@
           <a:p>
             <a:fld id="{72BAB100-02CC-449F-BB38-EDA663640175}" type="datetimeFigureOut">
               <a:rPr lang="zh-CN" altLang="en-US" smtClean="0"/>
-              <a:t>2022/3/21</a:t>
+              <a:t>2022/3/26</a:t>
             </a:fld>
             <a:endParaRPr lang="zh-CN" altLang="en-US"/>
           </a:p>
@@ -2375,7 +2380,7 @@
           <a:p>
             <a:fld id="{72BAB100-02CC-449F-BB38-EDA663640175}" type="datetimeFigureOut">
               <a:rPr lang="zh-CN" altLang="en-US" smtClean="0"/>
-              <a:t>2022/3/21</a:t>
+              <a:t>2022/3/26</a:t>
             </a:fld>
             <a:endParaRPr lang="zh-CN" altLang="en-US"/>
           </a:p>
@@ -2663,7 +2668,7 @@
           <a:p>
             <a:fld id="{72BAB100-02CC-449F-BB38-EDA663640175}" type="datetimeFigureOut">
               <a:rPr lang="zh-CN" altLang="en-US" smtClean="0"/>
-              <a:t>2022/3/21</a:t>
+              <a:t>2022/3/26</a:t>
             </a:fld>
             <a:endParaRPr lang="zh-CN" altLang="en-US"/>
           </a:p>
@@ -2904,7 +2909,7 @@
           <a:p>
             <a:fld id="{72BAB100-02CC-449F-BB38-EDA663640175}" type="datetimeFigureOut">
               <a:rPr lang="zh-CN" altLang="en-US" smtClean="0"/>
-              <a:t>2022/3/21</a:t>
+              <a:t>2022/3/26</a:t>
             </a:fld>
             <a:endParaRPr lang="zh-CN" altLang="en-US"/>
           </a:p>
@@ -3335,8 +3340,8 @@
         </p:nvSpPr>
         <p:spPr>
           <a:xfrm>
-            <a:off x="1745672" y="2369127"/>
-            <a:ext cx="5652656" cy="2119746"/>
+            <a:off x="4301269" y="2896829"/>
+            <a:ext cx="2122518" cy="674605"/>
           </a:xfrm>
           <a:prstGeom prst="roundRect">
             <a:avLst/>
@@ -3373,61 +3378,22 @@
           </a:p>
         </p:txBody>
       </p:sp>
-      <p:pic>
-        <p:nvPicPr>
-          <p:cNvPr id="6" name="图形 5" descr="聊天 RTL">
-            <a:extLst>
-              <a:ext uri="{FF2B5EF4-FFF2-40B4-BE49-F238E27FC236}">
-                <a16:creationId xmlns:a16="http://schemas.microsoft.com/office/drawing/2014/main" id="{798A706F-1EC6-400F-A214-39D4ED40534E}"/>
-              </a:ext>
-            </a:extLst>
-          </p:cNvPr>
-          <p:cNvPicPr>
-            <a:picLocks noChangeAspect="1"/>
-          </p:cNvPicPr>
+      <p:sp>
+        <p:nvSpPr>
+          <p:cNvPr id="7" name="矩形 6">
+            <a:extLst>
+              <a:ext uri="{FF2B5EF4-FFF2-40B4-BE49-F238E27FC236}">
+                <a16:creationId xmlns:a16="http://schemas.microsoft.com/office/drawing/2014/main" id="{AFAEF1EE-AA53-4858-8EE0-509739B33117}"/>
+              </a:ext>
+            </a:extLst>
+          </p:cNvPr>
+          <p:cNvSpPr/>
           <p:nvPr/>
-        </p:nvPicPr>
-        <p:blipFill>
-          <a:blip r:embed="rId2">
-            <a:extLst>
-              <a:ext uri="{28A0092B-C50C-407E-A947-70E740481C1C}">
-                <a14:useLocalDpi xmlns:a14="http://schemas.microsoft.com/office/drawing/2010/main" val="0"/>
-              </a:ext>
-              <a:ext uri="{96DAC541-7B7A-43D3-8B79-37D633B846F1}">
-                <asvg:svgBlip xmlns:asvg="http://schemas.microsoft.com/office/drawing/2016/SVG/main" r:embed="rId3"/>
-              </a:ext>
-            </a:extLst>
-          </a:blip>
-          <a:stretch>
-            <a:fillRect/>
-          </a:stretch>
-        </p:blipFill>
+        </p:nvSpPr>
         <p:spPr>
           <a:xfrm>
-            <a:off x="2230581" y="2948246"/>
-            <a:ext cx="1161011" cy="1161011"/>
-          </a:xfrm>
-          <a:prstGeom prst="rect">
-            <a:avLst/>
-          </a:prstGeom>
-        </p:spPr>
-      </p:pic>
-      <p:sp>
-        <p:nvSpPr>
-          <p:cNvPr id="7" name="矩形 6">
-            <a:extLst>
-              <a:ext uri="{FF2B5EF4-FFF2-40B4-BE49-F238E27FC236}">
-                <a16:creationId xmlns:a16="http://schemas.microsoft.com/office/drawing/2014/main" id="{AFAEF1EE-AA53-4858-8EE0-509739B33117}"/>
-              </a:ext>
-            </a:extLst>
-          </p:cNvPr>
-          <p:cNvSpPr/>
-          <p:nvPr/>
-        </p:nvSpPr>
-        <p:spPr>
-          <a:xfrm>
-            <a:off x="3391592" y="2950864"/>
-            <a:ext cx="3941874" cy="956272"/>
+            <a:off x="4377470" y="2941745"/>
+            <a:ext cx="1970117" cy="584775"/>
           </a:xfrm>
           <a:prstGeom prst="rect">
             <a:avLst/>
@@ -3442,7 +3408,7 @@
           <a:p>
             <a:pPr algn="ctr"/>
             <a:r>
-              <a:rPr lang="en-US" altLang="zh-CN" sz="5400" b="1" cap="none" spc="0" dirty="0">
+              <a:rPr lang="en-US" altLang="zh-CN" sz="3200" b="1" cap="none" spc="0" dirty="0">
                 <a:ln w="9525">
                   <a:solidFill>
                     <a:schemeClr val="bg1"/>
@@ -3463,7 +3429,7 @@
               </a:rPr>
               <a:t>web3chat</a:t>
             </a:r>
-            <a:endParaRPr lang="zh-CN" altLang="en-US" sz="5400" b="1" cap="none" spc="0" dirty="0">
+            <a:endParaRPr lang="zh-CN" altLang="en-US" sz="3200" b="1" cap="none" spc="0" dirty="0">
               <a:ln w="9525">
                 <a:solidFill>
                   <a:schemeClr val="bg1"/>

</xml_diff>